<commit_message>
Updates images and diagrams
</commit_message>
<xml_diff>
--- a/specifications/diagrams/TDW2022-DID Method Namespaces 0.9.pptx
+++ b/specifications/diagrams/TDW2022-DID Method Namespaces 0.9.pptx
@@ -8,6 +8,7 @@
     <p:sldId id="256" r:id="rId2"/>
     <p:sldId id="257" r:id="rId3"/>
     <p:sldId id="258" r:id="rId4"/>
+    <p:sldId id="259" r:id="rId5"/>
   </p:sldIdLst>
   <p:sldSz cx="14630400" cy="6858000"/>
   <p:notesSz cx="6858000" cy="9144000"/>
@@ -245,7 +246,7 @@
           <a:p>
             <a:fld id="{FFFEF5D7-1469-4E74-9570-816BA0D29F90}" type="datetimeFigureOut">
               <a:rPr lang="en-US" smtClean="0"/>
-              <a:t>1/30/2022</a:t>
+              <a:t>2/2/2022</a:t>
             </a:fld>
             <a:endParaRPr lang="en-US" dirty="0"/>
           </a:p>
@@ -415,7 +416,7 @@
           <a:p>
             <a:fld id="{FFFEF5D7-1469-4E74-9570-816BA0D29F90}" type="datetimeFigureOut">
               <a:rPr lang="en-US" smtClean="0"/>
-              <a:t>1/30/2022</a:t>
+              <a:t>2/2/2022</a:t>
             </a:fld>
             <a:endParaRPr lang="en-US" dirty="0"/>
           </a:p>
@@ -595,7 +596,7 @@
           <a:p>
             <a:fld id="{FFFEF5D7-1469-4E74-9570-816BA0D29F90}" type="datetimeFigureOut">
               <a:rPr lang="en-US" smtClean="0"/>
-              <a:t>1/30/2022</a:t>
+              <a:t>2/2/2022</a:t>
             </a:fld>
             <a:endParaRPr lang="en-US" dirty="0"/>
           </a:p>
@@ -765,7 +766,7 @@
           <a:p>
             <a:fld id="{FFFEF5D7-1469-4E74-9570-816BA0D29F90}" type="datetimeFigureOut">
               <a:rPr lang="en-US" smtClean="0"/>
-              <a:t>1/30/2022</a:t>
+              <a:t>2/2/2022</a:t>
             </a:fld>
             <a:endParaRPr lang="en-US" dirty="0"/>
           </a:p>
@@ -1011,7 +1012,7 @@
           <a:p>
             <a:fld id="{FFFEF5D7-1469-4E74-9570-816BA0D29F90}" type="datetimeFigureOut">
               <a:rPr lang="en-US" smtClean="0"/>
-              <a:t>1/30/2022</a:t>
+              <a:t>2/2/2022</a:t>
             </a:fld>
             <a:endParaRPr lang="en-US" dirty="0"/>
           </a:p>
@@ -1243,7 +1244,7 @@
           <a:p>
             <a:fld id="{FFFEF5D7-1469-4E74-9570-816BA0D29F90}" type="datetimeFigureOut">
               <a:rPr lang="en-US" smtClean="0"/>
-              <a:t>1/30/2022</a:t>
+              <a:t>2/2/2022</a:t>
             </a:fld>
             <a:endParaRPr lang="en-US" dirty="0"/>
           </a:p>
@@ -1610,7 +1611,7 @@
           <a:p>
             <a:fld id="{FFFEF5D7-1469-4E74-9570-816BA0D29F90}" type="datetimeFigureOut">
               <a:rPr lang="en-US" smtClean="0"/>
-              <a:t>1/30/2022</a:t>
+              <a:t>2/2/2022</a:t>
             </a:fld>
             <a:endParaRPr lang="en-US" dirty="0"/>
           </a:p>
@@ -1728,7 +1729,7 @@
           <a:p>
             <a:fld id="{FFFEF5D7-1469-4E74-9570-816BA0D29F90}" type="datetimeFigureOut">
               <a:rPr lang="en-US" smtClean="0"/>
-              <a:t>1/30/2022</a:t>
+              <a:t>2/2/2022</a:t>
             </a:fld>
             <a:endParaRPr lang="en-US" dirty="0"/>
           </a:p>
@@ -1823,7 +1824,7 @@
           <a:p>
             <a:fld id="{FFFEF5D7-1469-4E74-9570-816BA0D29F90}" type="datetimeFigureOut">
               <a:rPr lang="en-US" smtClean="0"/>
-              <a:t>1/30/2022</a:t>
+              <a:t>2/2/2022</a:t>
             </a:fld>
             <a:endParaRPr lang="en-US" dirty="0"/>
           </a:p>
@@ -2100,7 +2101,7 @@
           <a:p>
             <a:fld id="{FFFEF5D7-1469-4E74-9570-816BA0D29F90}" type="datetimeFigureOut">
               <a:rPr lang="en-US" smtClean="0"/>
-              <a:t>1/30/2022</a:t>
+              <a:t>2/2/2022</a:t>
             </a:fld>
             <a:endParaRPr lang="en-US" dirty="0"/>
           </a:p>
@@ -2356,7 +2357,7 @@
           <a:p>
             <a:fld id="{FFFEF5D7-1469-4E74-9570-816BA0D29F90}" type="datetimeFigureOut">
               <a:rPr lang="en-US" smtClean="0"/>
-              <a:t>1/30/2022</a:t>
+              <a:t>2/2/2022</a:t>
             </a:fld>
             <a:endParaRPr lang="en-US" dirty="0"/>
           </a:p>
@@ -2569,7 +2570,7 @@
           <a:p>
             <a:fld id="{FFFEF5D7-1469-4E74-9570-816BA0D29F90}" type="datetimeFigureOut">
               <a:rPr lang="en-US" smtClean="0"/>
-              <a:t>1/30/2022</a:t>
+              <a:t>2/2/2022</a:t>
             </a:fld>
             <a:endParaRPr lang="en-US" dirty="0"/>
           </a:p>
@@ -5399,8 +5400,8 @@
         </p:nvSpPr>
         <p:spPr>
           <a:xfrm>
-            <a:off x="1005840" y="0"/>
-            <a:ext cx="12618720" cy="1690689"/>
+            <a:off x="924129" y="0"/>
+            <a:ext cx="12700431" cy="1690689"/>
           </a:xfrm>
         </p:spPr>
         <p:txBody>
@@ -5409,7 +5410,15 @@
           <a:p>
             <a:r>
               <a:rPr lang="en-US" b="1" dirty="0"/>
-              <a:t>New DID Entity Class: Activity</a:t>
+              <a:t>New (4</a:t>
+            </a:r>
+            <a:r>
+              <a:rPr lang="en-US" b="1" baseline="30000" dirty="0"/>
+              <a:t>th</a:t>
+            </a:r>
+            <a:r>
+              <a:rPr lang="en-US" b="1" dirty="0"/>
+              <a:t>) DID-Identifiable Entity Class: Activity</a:t>
             </a:r>
           </a:p>
         </p:txBody>
@@ -5432,19 +5441,19 @@
         </p:nvSpPr>
         <p:spPr>
           <a:xfrm>
-            <a:off x="1005839" y="1284050"/>
-            <a:ext cx="13079811" cy="5573950"/>
+            <a:off x="924129" y="1284050"/>
+            <a:ext cx="13161522" cy="5058384"/>
           </a:xfrm>
         </p:spPr>
         <p:txBody>
           <a:bodyPr>
-            <a:normAutofit/>
+            <a:normAutofit fontScale="92500" lnSpcReduction="10000"/>
           </a:bodyPr>
           <a:lstStyle/>
           <a:p>
             <a:r>
               <a:rPr lang="en-US" dirty="0"/>
-              <a:t>In addition to People, Organizations, and Things, there is a (new) 4</a:t>
+              <a:t>In addition to People, Organizations, and Things, there is a new 4</a:t>
             </a:r>
             <a:r>
               <a:rPr lang="en-US" baseline="30000" dirty="0"/>
@@ -5452,24 +5461,20 @@
             </a:r>
             <a:r>
               <a:rPr lang="en-US" dirty="0"/>
-              <a:t> class of DID Entity</a:t>
+              <a:t> class of DID entity</a:t>
             </a:r>
           </a:p>
           <a:p>
             <a:pPr lvl="1"/>
             <a:r>
               <a:rPr lang="en-US" dirty="0"/>
-              <a:t>…and, as a result, potentially other new classes of DID Entities waiting to be discovered</a:t>
-            </a:r>
-          </a:p>
-          <a:p>
-            <a:r>
-              <a:rPr lang="en-US"/>
-              <a:t>4th </a:t>
-            </a:r>
+              <a:t>…and, as a result, potentially other new classes of DID entities waiting to be discovered</a:t>
+            </a:r>
+          </a:p>
+          <a:p>
             <a:r>
               <a:rPr lang="en-US" dirty="0"/>
-              <a:t>new class: Activity (Non-Fungible Activity)</a:t>
+              <a:t>4th new class: Activity (Non-Fungible Activity)</a:t>
             </a:r>
           </a:p>
           <a:p>
@@ -5481,22 +5486,21 @@
           <a:p>
             <a:r>
               <a:rPr lang="en-US" dirty="0"/>
-              <a:t>An Activity is a self-contained (usually historical) sequence or </a:t>
+              <a:t>An Activity is a self-contained (usually historical) sequence (or </a:t>
             </a:r>
             <a:br>
               <a:rPr lang="en-US" dirty="0"/>
             </a:br>
             <a:r>
               <a:rPr lang="en-US" dirty="0"/>
-              <a:t>time series of measurable, closely </a:t>
-            </a:r>
-            <a:r>
-              <a:rPr lang="en-US" dirty="0" err="1"/>
-              <a:t>correlatible</a:t>
-            </a:r>
+              <a:t>time-series) of measurable, closely correlatable but distinct steps</a:t>
+            </a:r>
+          </a:p>
+          <a:p>
+            <a:pPr lvl="1"/>
             <a:r>
               <a:rPr lang="en-US" dirty="0"/>
-              <a:t>, distinct steps</a:t>
+              <a:t>Beginning, middle, and finish steps</a:t>
             </a:r>
           </a:p>
           <a:p>
@@ -5516,14 +5520,14 @@
             <a:pPr lvl="1"/>
             <a:r>
               <a:rPr lang="en-US" dirty="0"/>
-              <a:t>Car Crash, Hug, 5-course Dinner, a Belch, an Infection, a Surgery, Throw of a Bowling Bowl,</a:t>
+              <a:t>Car Crash, Hug, 5-course Dinner, a Belch, an Infection, a Surgery, Throw of a Bowling Ball,</a:t>
             </a:r>
             <a:br>
               <a:rPr lang="en-US" dirty="0"/>
             </a:br>
             <a:r>
               <a:rPr lang="en-US" dirty="0"/>
-              <a:t>Baseball Pitch, Trajectory of a Football or any Projectile, …</a:t>
+              <a:t>Baseball Pitch, Kicking a Field Goal in Football, …</a:t>
             </a:r>
           </a:p>
           <a:p>
@@ -5566,7 +5570,7 @@
         </p:blipFill>
         <p:spPr>
           <a:xfrm>
-            <a:off x="10385868" y="2121447"/>
+            <a:off x="10064854" y="1946346"/>
             <a:ext cx="4161012" cy="2810475"/>
           </a:xfrm>
           <a:prstGeom prst="rect">
@@ -5578,6 +5582,206 @@
     <p:extLst>
       <p:ext uri="{BB962C8B-B14F-4D97-AF65-F5344CB8AC3E}">
         <p14:creationId xmlns:p14="http://schemas.microsoft.com/office/powerpoint/2010/main" val="4243475327"/>
+      </p:ext>
+    </p:extLst>
+  </p:cSld>
+  <p:clrMapOvr>
+    <a:masterClrMapping/>
+  </p:clrMapOvr>
+</p:sld>
+</file>
+
+<file path=ppt/slides/slide4.xml><?xml version="1.0" encoding="utf-8"?>
+<p:sld xmlns:a="http://schemas.openxmlformats.org/drawingml/2006/main" xmlns:r="http://schemas.openxmlformats.org/officeDocument/2006/relationships" xmlns:p="http://schemas.openxmlformats.org/presentationml/2006/main">
+  <p:cSld>
+    <p:spTree>
+      <p:nvGrpSpPr>
+        <p:cNvPr id="1" name=""/>
+        <p:cNvGrpSpPr/>
+        <p:nvPr/>
+      </p:nvGrpSpPr>
+      <p:grpSpPr>
+        <a:xfrm>
+          <a:off x="0" y="0"/>
+          <a:ext cx="0" cy="0"/>
+          <a:chOff x="0" y="0"/>
+          <a:chExt cx="0" cy="0"/>
+        </a:xfrm>
+      </p:grpSpPr>
+      <p:sp>
+        <p:nvSpPr>
+          <p:cNvPr id="2" name="Title 1">
+            <a:extLst>
+              <a:ext uri="{FF2B5EF4-FFF2-40B4-BE49-F238E27FC236}">
+                <a16:creationId xmlns:a16="http://schemas.microsoft.com/office/drawing/2014/main" id="{AC6D6DE9-6E55-40FD-BABC-46F8FF2DC8EA}"/>
+              </a:ext>
+            </a:extLst>
+          </p:cNvPr>
+          <p:cNvSpPr>
+            <a:spLocks noGrp="1"/>
+          </p:cNvSpPr>
+          <p:nvPr>
+            <p:ph type="title"/>
+          </p:nvPr>
+        </p:nvSpPr>
+        <p:spPr>
+          <a:xfrm>
+            <a:off x="904672" y="0"/>
+            <a:ext cx="12719888" cy="1690689"/>
+          </a:xfrm>
+        </p:spPr>
+        <p:txBody>
+          <a:bodyPr/>
+          <a:lstStyle/>
+          <a:p>
+            <a:r>
+              <a:rPr lang="en-US" b="1" dirty="0"/>
+              <a:t>New (5</a:t>
+            </a:r>
+            <a:r>
+              <a:rPr lang="en-US" b="1" baseline="30000" dirty="0"/>
+              <a:t>th</a:t>
+            </a:r>
+            <a:r>
+              <a:rPr lang="en-US" b="1" dirty="0"/>
+              <a:t>) DID-Identifiable Entity Class: Marketplace</a:t>
+            </a:r>
+          </a:p>
+        </p:txBody>
+      </p:sp>
+      <p:sp>
+        <p:nvSpPr>
+          <p:cNvPr id="3" name="Content Placeholder 2">
+            <a:extLst>
+              <a:ext uri="{FF2B5EF4-FFF2-40B4-BE49-F238E27FC236}">
+                <a16:creationId xmlns:a16="http://schemas.microsoft.com/office/drawing/2014/main" id="{3936201D-E85B-4542-A82E-4AAA5F6E9F60}"/>
+              </a:ext>
+            </a:extLst>
+          </p:cNvPr>
+          <p:cNvSpPr>
+            <a:spLocks noGrp="1"/>
+          </p:cNvSpPr>
+          <p:nvPr>
+            <p:ph idx="1"/>
+          </p:nvPr>
+        </p:nvSpPr>
+        <p:spPr>
+          <a:xfrm>
+            <a:off x="904673" y="1284050"/>
+            <a:ext cx="13501992" cy="5573950"/>
+          </a:xfrm>
+        </p:spPr>
+        <p:txBody>
+          <a:bodyPr>
+            <a:normAutofit fontScale="92500" lnSpcReduction="10000"/>
+          </a:bodyPr>
+          <a:lstStyle/>
+          <a:p>
+            <a:r>
+              <a:rPr lang="en-US" dirty="0"/>
+              <a:t>In addition to People, Organizations, Things, and Activities, there is a new 5</a:t>
+            </a:r>
+            <a:r>
+              <a:rPr lang="en-US" baseline="30000" dirty="0"/>
+              <a:t>th</a:t>
+            </a:r>
+            <a:r>
+              <a:rPr lang="en-US" dirty="0"/>
+              <a:t> class of DID entity</a:t>
+            </a:r>
+          </a:p>
+          <a:p>
+            <a:pPr lvl="1"/>
+            <a:r>
+              <a:rPr lang="en-US" dirty="0"/>
+              <a:t>…and, as a result, potentially other new classes of DID entities waiting to be discovered</a:t>
+            </a:r>
+          </a:p>
+          <a:p>
+            <a:r>
+              <a:rPr lang="en-US" dirty="0"/>
+              <a:t>5th new class: Marketplace</a:t>
+            </a:r>
+          </a:p>
+          <a:p>
+            <a:r>
+              <a:rPr lang="en-US" dirty="0"/>
+              <a:t>A Marketplace is different from an Organization and a Thing</a:t>
+            </a:r>
+          </a:p>
+          <a:p>
+            <a:r>
+              <a:rPr lang="en-US" dirty="0"/>
+              <a:t>A Marketplace is </a:t>
+            </a:r>
+            <a:r>
+              <a:rPr lang="en-US"/>
+              <a:t>a (digital) Service </a:t>
+            </a:r>
+            <a:r>
+              <a:rPr lang="en-US" dirty="0"/>
+              <a:t>where:</a:t>
+            </a:r>
+          </a:p>
+          <a:p>
+            <a:pPr marL="971550" lvl="1" indent="-514350">
+              <a:buFont typeface="+mj-lt"/>
+              <a:buAutoNum type="romanLcPeriod"/>
+            </a:pPr>
+            <a:r>
+              <a:rPr lang="en-US" dirty="0"/>
+              <a:t>Assets are offered for sale by an Offering Party, bid upon, purchased by, and delivered to an Acquiring Party.</a:t>
+            </a:r>
+          </a:p>
+          <a:p>
+            <a:pPr marL="971550" lvl="1" indent="-514350">
+              <a:buFont typeface="+mj-lt"/>
+              <a:buAutoNum type="romanLcPeriod"/>
+            </a:pPr>
+            <a:r>
+              <a:rPr lang="en-US" dirty="0"/>
+              <a:t>Assets are offered in exchange for other Assets between two or more Offering Parties.</a:t>
+            </a:r>
+          </a:p>
+          <a:p>
+            <a:pPr marL="971550" lvl="1" indent="-514350">
+              <a:buFont typeface="+mj-lt"/>
+              <a:buAutoNum type="romanLcPeriod"/>
+            </a:pPr>
+            <a:r>
+              <a:rPr lang="en-US" dirty="0"/>
+              <a:t>Deeds (Marketplace Policies) are negotiated and/or accepted for the conveyance of Title (a set of rights) to the Asset from the Offering Party to the Acquiring Party.</a:t>
+            </a:r>
+          </a:p>
+          <a:p>
+            <a:pPr marL="971550" lvl="1" indent="-514350">
+              <a:buFont typeface="+mj-lt"/>
+              <a:buAutoNum type="romanLcPeriod"/>
+            </a:pPr>
+            <a:r>
+              <a:rPr lang="en-US" dirty="0"/>
+              <a:t>Business documents (e.g. purchase orders, invoices, waybills, and delivery confirmations, etc.) can also exchanged and reconciled through a Marketplace when it is easier to use a Marketplace than it is to engage in direct two-party (or multi-party) exchanges and reconciliations.</a:t>
+            </a:r>
+          </a:p>
+          <a:p>
+            <a:r>
+              <a:rPr lang="en-US" dirty="0"/>
+              <a:t>Examples</a:t>
+            </a:r>
+          </a:p>
+          <a:p>
+            <a:pPr lvl="1"/>
+            <a:r>
+              <a:rPr lang="en-US" dirty="0"/>
+              <a:t>NFE (NFT) marketplaces, international trading centers involving Letters of Credit (and/or similar instruments), international and regional freight shipping networks, marketplaces for other products and service offerings, …</a:t>
+            </a:r>
+          </a:p>
+        </p:txBody>
+      </p:sp>
+    </p:spTree>
+    <p:extLst>
+      <p:ext uri="{BB962C8B-B14F-4D97-AF65-F5344CB8AC3E}">
+        <p14:creationId xmlns:p14="http://schemas.microsoft.com/office/powerpoint/2010/main" val="3533835601"/>
       </p:ext>
     </p:extLst>
   </p:cSld>

</xml_diff>